<commit_message>
Überarbeitung Fixture Ergänzung Aussicht
</commit_message>
<xml_diff>
--- a/TestenMileStone2.pptx
+++ b/TestenMileStone2.pptx
@@ -4636,10 +4636,6 @@
           <a:lstStyle/>
           <a:p>
             <a:r>
-              <a:rPr lang="de-DE" dirty="0" smtClean="0"/>
-              <a:t>das </a:t>
-            </a:r>
-            <a:r>
               <a:rPr lang="de-DE" dirty="0" err="1" smtClean="0"/>
               <a:t>Fixture</a:t>
             </a:r>
@@ -4649,15 +4645,17 @@
             <a:pPr lvl="1"/>
             <a:r>
               <a:rPr lang="de-DE" dirty="0" smtClean="0"/>
-              <a:t>die Hürden</a:t>
-            </a:r>
+              <a:t>Hürden</a:t>
+            </a:r>
+            <a:endParaRPr lang="de-DE" dirty="0" smtClean="0"/>
           </a:p>
           <a:p>
             <a:pPr lvl="1"/>
             <a:r>
               <a:rPr lang="de-DE" dirty="0" smtClean="0"/>
-              <a:t>die Lösungen</a:t>
-            </a:r>
+              <a:t>Lösungen</a:t>
+            </a:r>
+            <a:endParaRPr lang="de-DE" dirty="0" smtClean="0"/>
           </a:p>
           <a:p>
             <a:r>
@@ -4800,10 +4798,6 @@
               <a:rPr lang="de-DE" dirty="0" smtClean="0"/>
             </a:br>
             <a:r>
-              <a:rPr lang="de-DE" sz="2000" dirty="0" smtClean="0"/>
-              <a:t>das </a:t>
-            </a:r>
-            <a:r>
               <a:rPr lang="de-DE" sz="2000" dirty="0" err="1" smtClean="0"/>
               <a:t>Fixture</a:t>
             </a:r>
@@ -4828,31 +4822,36 @@
           <a:p>
             <a:r>
               <a:rPr lang="de-DE" dirty="0" smtClean="0"/>
-              <a:t>Das </a:t>
-            </a:r>
-            <a:r>
-              <a:rPr lang="de-DE" dirty="0"/>
               <a:t>Ziel des </a:t>
             </a:r>
             <a:r>
-              <a:rPr lang="de-DE" dirty="0" err="1"/>
+              <a:rPr lang="de-DE" dirty="0" err="1" smtClean="0"/>
               <a:t>Fixtures</a:t>
             </a:r>
             <a:r>
-              <a:rPr lang="de-DE" dirty="0"/>
-              <a:t> ist es eine Aktion in der HAW-App auszuführen, wie zum Beispiel einen Button zu </a:t>
-            </a:r>
-            <a:r>
               <a:rPr lang="de-DE" dirty="0" smtClean="0"/>
-              <a:t>klicken</a:t>
-            </a:r>
-          </a:p>
-          <a:p>
-            <a:pPr marL="320040" lvl="1" indent="-274320"/>
-            <a:r>
-              <a:rPr lang="de-DE" dirty="0"/>
-              <a:t>In unserem Fall einen Test-Login </a:t>
-            </a:r>
+              <a:t>: Test Editor Tests für Apps schreiben können</a:t>
+            </a:r>
+          </a:p>
+          <a:p>
+            <a:r>
+              <a:rPr lang="de-DE" dirty="0" smtClean="0"/>
+              <a:t>Realisierung durch Anbindung an </a:t>
+            </a:r>
+            <a:r>
+              <a:rPr lang="de-DE" dirty="0" err="1" smtClean="0"/>
+              <a:t>Appium</a:t>
+            </a:r>
+            <a:endParaRPr lang="de-DE" dirty="0" smtClean="0"/>
+          </a:p>
+          <a:p>
+            <a:r>
+              <a:rPr lang="de-DE" dirty="0" smtClean="0"/>
+              <a:t>Implementierung von Aktionen für Apps in Test Editor</a:t>
+            </a:r>
+          </a:p>
+          <a:p>
+            <a:endParaRPr lang="de-DE" dirty="0" smtClean="0"/>
           </a:p>
           <a:p>
             <a:endParaRPr lang="de-DE" dirty="0"/>
@@ -4976,10 +4975,6 @@
           <a:lstStyle/>
           <a:p>
             <a:r>
-              <a:rPr lang="de-DE" dirty="0" smtClean="0"/>
-              <a:t>Das </a:t>
-            </a:r>
-            <a:r>
               <a:rPr lang="de-DE" dirty="0" err="1" smtClean="0"/>
               <a:t>Fixture</a:t>
             </a:r>
@@ -4991,8 +4986,8 @@
               <a:rPr lang="de-DE" dirty="0" smtClean="0"/>
             </a:br>
             <a:r>
-              <a:rPr lang="de-DE" sz="2000" dirty="0" smtClean="0"/>
-              <a:t>die Hürden</a:t>
+              <a:rPr lang="de-DE" sz="2000" dirty="0" err="1" smtClean="0"/>
+              <a:t>HÜrden</a:t>
             </a:r>
             <a:endParaRPr lang="de-DE" sz="2000" dirty="0"/>
           </a:p>
@@ -5014,48 +5009,74 @@
           <a:lstStyle/>
           <a:p>
             <a:r>
-              <a:rPr lang="de-DE" dirty="0"/>
-              <a:t>Viele </a:t>
-            </a:r>
-            <a:r>
-              <a:rPr lang="de-DE" dirty="0" err="1"/>
-              <a:t>Exceptions</a:t>
-            </a:r>
-            <a:r>
-              <a:rPr lang="de-DE" dirty="0"/>
-              <a:t>, die hintereinander auftraten</a:t>
-            </a:r>
-          </a:p>
-          <a:p>
-            <a:pPr lvl="1"/>
-            <a:r>
-              <a:rPr lang="en-US" dirty="0" err="1"/>
-              <a:t>Folge</a:t>
-            </a:r>
-            <a:r>
-              <a:rPr lang="en-US" dirty="0"/>
-              <a:t>:  </a:t>
-            </a:r>
-            <a:r>
-              <a:rPr lang="en-US" dirty="0" err="1"/>
-              <a:t>Hoher</a:t>
-            </a:r>
-            <a:r>
-              <a:rPr lang="en-US" dirty="0"/>
-              <a:t> </a:t>
-            </a:r>
-            <a:r>
-              <a:rPr lang="en-US" dirty="0" err="1"/>
-              <a:t>Zeitaufwand</a:t>
-            </a:r>
-            <a:r>
-              <a:rPr lang="en-US" dirty="0"/>
-              <a:t>  </a:t>
-            </a:r>
-          </a:p>
-          <a:p>
-            <a:pPr lvl="1"/>
-            <a:endParaRPr lang="de-DE" dirty="0"/>
+              <a:rPr lang="de-DE" dirty="0" smtClean="0"/>
+              <a:t>Dokumentation zur </a:t>
+            </a:r>
+            <a:r>
+              <a:rPr lang="de-DE" dirty="0" err="1" smtClean="0"/>
+              <a:t>Fixture</a:t>
+            </a:r>
+            <a:r>
+              <a:rPr lang="de-DE" dirty="0" smtClean="0"/>
+              <a:t> Erstellung nicht ausführlich genug</a:t>
+            </a:r>
+          </a:p>
+          <a:p>
+            <a:r>
+              <a:rPr lang="de-DE" dirty="0" smtClean="0"/>
+              <a:t>Bauen des Core-</a:t>
+            </a:r>
+            <a:r>
+              <a:rPr lang="de-DE" dirty="0" err="1" smtClean="0"/>
+              <a:t>Fixtures</a:t>
+            </a:r>
+            <a:endParaRPr lang="de-DE" dirty="0" smtClean="0"/>
+          </a:p>
+          <a:p>
+            <a:r>
+              <a:rPr lang="de-DE" dirty="0" err="1" smtClean="0"/>
+              <a:t>Maven</a:t>
+            </a:r>
+            <a:r>
+              <a:rPr lang="de-DE" dirty="0" smtClean="0"/>
+              <a:t> + Core-</a:t>
+            </a:r>
+            <a:r>
+              <a:rPr lang="de-DE" dirty="0" err="1" smtClean="0"/>
+              <a:t>Fixture</a:t>
+            </a:r>
+            <a:endParaRPr lang="de-DE" dirty="0"/>
+          </a:p>
+          <a:p>
+            <a:r>
+              <a:rPr lang="de-DE" dirty="0" smtClean="0"/>
+              <a:t>Schwieriges Debugging der </a:t>
+            </a:r>
+            <a:r>
+              <a:rPr lang="de-DE" dirty="0" err="1" smtClean="0"/>
+              <a:t>Fixture</a:t>
+            </a:r>
+            <a:r>
+              <a:rPr lang="de-DE" dirty="0" smtClean="0"/>
+              <a:t>, da </a:t>
+            </a:r>
+            <a:r>
+              <a:rPr lang="de-DE" dirty="0" err="1" smtClean="0"/>
+              <a:t>Fitnesse</a:t>
+            </a:r>
+            <a:r>
+              <a:rPr lang="de-DE" dirty="0" smtClean="0"/>
+              <a:t> Fehlermeldungen teils irreführend</a:t>
+            </a:r>
+          </a:p>
+          <a:p>
+            <a:endParaRPr lang="de-DE" dirty="0"/>
+          </a:p>
+          <a:p>
+            <a:r>
+              <a:rPr lang="de-DE" dirty="0" smtClean="0"/>
+              <a:t>Kostet viel Zeit</a:t>
+            </a:r>
           </a:p>
         </p:txBody>
       </p:sp>
@@ -5163,11 +5184,7 @@
           <a:lstStyle/>
           <a:p>
             <a:r>
-              <a:rPr lang="de-DE" dirty="0"/>
-              <a:t>Das </a:t>
-            </a:r>
-            <a:r>
-              <a:rPr lang="de-DE" dirty="0" err="1"/>
+              <a:rPr lang="de-DE" dirty="0" err="1" smtClean="0"/>
               <a:t>Fixture</a:t>
             </a:r>
             <a:r>
@@ -5178,10 +5195,6 @@
               <a:rPr lang="de-DE" dirty="0"/>
             </a:br>
             <a:r>
-              <a:rPr lang="de-DE" sz="2000" dirty="0" smtClean="0"/>
-              <a:t>die </a:t>
-            </a:r>
-            <a:r>
               <a:rPr lang="de-DE" sz="2000" dirty="0" err="1" smtClean="0"/>
               <a:t>lösungen</a:t>
             </a:r>
@@ -5204,7 +5217,79 @@
           <a:bodyPr/>
           <a:lstStyle/>
           <a:p>
-            <a:endParaRPr lang="de-DE"/>
+            <a:r>
+              <a:rPr lang="de-DE" dirty="0" smtClean="0"/>
+              <a:t>Bauen eines existierenden </a:t>
+            </a:r>
+            <a:r>
+              <a:rPr lang="de-DE" dirty="0" err="1" smtClean="0"/>
+              <a:t>Fixtures</a:t>
+            </a:r>
+            <a:r>
+              <a:rPr lang="de-DE" dirty="0" smtClean="0"/>
+              <a:t> aus original Repository auf </a:t>
+            </a:r>
+            <a:r>
+              <a:rPr lang="de-DE" dirty="0" err="1" smtClean="0"/>
+              <a:t>Github</a:t>
+            </a:r>
+            <a:endParaRPr lang="de-DE" dirty="0" smtClean="0"/>
+          </a:p>
+          <a:p>
+            <a:r>
+              <a:rPr lang="de-DE" dirty="0" smtClean="0"/>
+              <a:t>Bauen des Core-</a:t>
+            </a:r>
+            <a:r>
+              <a:rPr lang="de-DE" dirty="0" err="1" smtClean="0"/>
+              <a:t>Fixtures</a:t>
+            </a:r>
+            <a:r>
+              <a:rPr lang="de-DE" dirty="0" smtClean="0"/>
+              <a:t> aus original Repository auf </a:t>
+            </a:r>
+            <a:r>
+              <a:rPr lang="de-DE" dirty="0" err="1" smtClean="0"/>
+              <a:t>Github</a:t>
+            </a:r>
+            <a:endParaRPr lang="de-DE" dirty="0" smtClean="0"/>
+          </a:p>
+          <a:p>
+            <a:r>
+              <a:rPr lang="de-DE" dirty="0" smtClean="0"/>
+              <a:t>Da Core-</a:t>
+            </a:r>
+            <a:r>
+              <a:rPr lang="de-DE" dirty="0" err="1" smtClean="0"/>
+              <a:t>Fixture</a:t>
+            </a:r>
+            <a:r>
+              <a:rPr lang="de-DE" dirty="0" smtClean="0"/>
+              <a:t> anscheinend auf internem Repository liegt, muss pom.xml angepasst werden</a:t>
+            </a:r>
+          </a:p>
+          <a:p>
+            <a:r>
+              <a:rPr lang="de-DE" dirty="0" smtClean="0"/>
+              <a:t>Trial &amp; Error um Fehler in </a:t>
+            </a:r>
+            <a:r>
+              <a:rPr lang="de-DE" dirty="0" err="1" smtClean="0"/>
+              <a:t>Fixture</a:t>
+            </a:r>
+            <a:r>
+              <a:rPr lang="de-DE" dirty="0" smtClean="0"/>
+              <a:t> zu beheben, viel Zeit da jedes mal neuer Testlauf</a:t>
+            </a:r>
+          </a:p>
+          <a:p>
+            <a:endParaRPr lang="de-DE" dirty="0" smtClean="0"/>
+          </a:p>
+          <a:p>
+            <a:endParaRPr lang="de-DE" dirty="0" smtClean="0"/>
+          </a:p>
+          <a:p>
+            <a:endParaRPr lang="de-DE" dirty="0"/>
           </a:p>
         </p:txBody>
       </p:sp>
@@ -5358,7 +5443,7 @@
               <a:t>Die Verbindung zwischen dem </a:t>
             </a:r>
             <a:r>
-              <a:rPr lang="de-DE" dirty="0" err="1">
+              <a:rPr lang="de-DE" dirty="0" err="1" smtClean="0">
                 <a:solidFill>
                   <a:srgbClr val="000000"/>
                 </a:solidFill>
@@ -5366,15 +5451,23 @@
               <a:t>Inspector</a:t>
             </a:r>
             <a:r>
-              <a:rPr lang="de-DE" dirty="0">
+              <a:rPr lang="de-DE" dirty="0" smtClean="0">
                 <a:solidFill>
                   <a:srgbClr val="000000"/>
                 </a:solidFill>
               </a:rPr>
-              <a:t>, </a:t>
-            </a:r>
-            <a:r>
-              <a:rPr lang="de-DE" dirty="0" err="1">
+              <a:t> </a:t>
+            </a:r>
+            <a:r>
+              <a:rPr lang="de-DE" dirty="0" smtClean="0">
+                <a:solidFill>
+                  <a:srgbClr val="000000"/>
+                </a:solidFill>
+              </a:rPr>
+              <a:t>&amp; </a:t>
+            </a:r>
+            <a:r>
+              <a:rPr lang="de-DE" dirty="0" err="1" smtClean="0">
                 <a:solidFill>
                   <a:srgbClr val="000000"/>
                 </a:solidFill>
@@ -5577,7 +5670,7 @@
               <a:t> </a:t>
             </a:r>
             <a:r>
-              <a:rPr lang="en-US" dirty="0" err="1"/>
+              <a:rPr lang="en-US" dirty="0" err="1" smtClean="0"/>
               <a:t>zwischen</a:t>
             </a:r>
             <a:r>
@@ -5585,12 +5678,12 @@
               <a:t> </a:t>
             </a:r>
             <a:r>
-              <a:rPr lang="en-US" dirty="0" err="1"/>
-              <a:t>dem</a:t>
+              <a:rPr lang="en-US" dirty="0" smtClean="0"/>
+              <a:t>Inspector </a:t>
             </a:r>
             <a:r>
               <a:rPr lang="en-US" dirty="0"/>
-              <a:t> Inspector und </a:t>
+              <a:t>und </a:t>
             </a:r>
             <a:r>
               <a:rPr lang="en-US" dirty="0" err="1"/>
@@ -5609,8 +5702,12 @@
           <a:p>
             <a:pPr lvl="1"/>
             <a:r>
+              <a:rPr lang="de-DE" dirty="0" smtClean="0"/>
+              <a:t>Problem: Importieren </a:t>
+            </a:r>
+            <a:r>
               <a:rPr lang="de-DE" dirty="0"/>
-              <a:t>Problem: da das Importieren von Daten in </a:t>
+              <a:t>von Daten in </a:t>
             </a:r>
             <a:r>
               <a:rPr lang="de-DE" dirty="0" err="1"/>
@@ -5618,20 +5715,92 @@
             </a:r>
             <a:r>
               <a:rPr lang="de-DE" dirty="0"/>
-              <a:t> schwierig ist</a:t>
-            </a:r>
-          </a:p>
-          <a:p>
-            <a:r>
-              <a:rPr lang="de-DE"/>
-              <a:t>weitere Masken in den Testeditor einfügen</a:t>
-            </a:r>
+              <a:t> </a:t>
+            </a:r>
+            <a:r>
+              <a:rPr lang="de-DE" dirty="0" smtClean="0"/>
+              <a:t>komplex</a:t>
+            </a:r>
+          </a:p>
+          <a:p>
+            <a:r>
+              <a:rPr lang="de-DE" dirty="0" smtClean="0"/>
+              <a:t>Aufbau von </a:t>
+            </a:r>
+            <a:r>
+              <a:rPr lang="de-DE" dirty="0" err="1" smtClean="0"/>
+              <a:t>Classification</a:t>
+            </a:r>
+            <a:r>
+              <a:rPr lang="de-DE" dirty="0" smtClean="0"/>
+              <a:t> </a:t>
+            </a:r>
+            <a:r>
+              <a:rPr lang="de-DE" dirty="0" err="1" smtClean="0"/>
+              <a:t>Tree</a:t>
+            </a:r>
+            <a:r>
+              <a:rPr lang="de-DE" dirty="0" smtClean="0"/>
+              <a:t> für HAW App</a:t>
+            </a:r>
+          </a:p>
+          <a:p>
+            <a:r>
+              <a:rPr lang="de-DE" dirty="0" smtClean="0"/>
+              <a:t>Ex- und Import aus </a:t>
+            </a:r>
+            <a:r>
+              <a:rPr lang="de-DE" dirty="0" err="1" smtClean="0"/>
+              <a:t>Testona</a:t>
+            </a:r>
+            <a:r>
+              <a:rPr lang="de-DE" dirty="0" smtClean="0"/>
+              <a:t> nach Test Editor</a:t>
+            </a:r>
+          </a:p>
+          <a:p>
+            <a:r>
+              <a:rPr lang="de-DE" dirty="0" err="1" smtClean="0"/>
+              <a:t>Classification</a:t>
+            </a:r>
+            <a:r>
+              <a:rPr lang="de-DE" dirty="0" smtClean="0"/>
+              <a:t> </a:t>
+            </a:r>
+            <a:r>
+              <a:rPr lang="de-DE" dirty="0" err="1" smtClean="0"/>
+              <a:t>Trees</a:t>
+            </a:r>
+            <a:r>
+              <a:rPr lang="de-DE" dirty="0" smtClean="0"/>
+              <a:t> nach </a:t>
+            </a:r>
+            <a:r>
+              <a:rPr lang="de-DE" smtClean="0"/>
+              <a:t>Heuristiken erstellen</a:t>
+            </a:r>
+            <a:endParaRPr lang="de-DE" dirty="0"/>
+          </a:p>
+          <a:p>
+            <a:r>
+              <a:rPr lang="de-DE" dirty="0" smtClean="0"/>
+              <a:t>(weitere </a:t>
+            </a:r>
+            <a:r>
+              <a:rPr lang="de-DE" dirty="0"/>
+              <a:t>Masken in den Testeditor </a:t>
+            </a:r>
+            <a:r>
+              <a:rPr lang="de-DE" dirty="0" smtClean="0"/>
+              <a:t>einfügen)</a:t>
+            </a:r>
+            <a:endParaRPr lang="de-DE" dirty="0"/>
           </a:p>
           <a:p>
             <a:pPr marL="45720" indent="0">
               <a:buNone/>
             </a:pPr>
-            <a:endParaRPr lang="de-DE"/>
+            <a:endParaRPr lang="de-DE" dirty="0"/>
           </a:p>
         </p:txBody>
       </p:sp>

</xml_diff>